<commit_message>
Modify 2. 실습환경 및 Python 기초.pptx
</commit_message>
<xml_diff>
--- a/ppt/2. 실습환경 및 Python 기초.pptx
+++ b/ppt/2. 실습환경 및 Python 기초.pptx
@@ -14,7 +14,11 @@
     <p:sldId id="308" r:id="rId8"/>
     <p:sldId id="309" r:id="rId9"/>
     <p:sldId id="310" r:id="rId10"/>
-    <p:sldId id="295" r:id="rId11"/>
+    <p:sldId id="311" r:id="rId11"/>
+    <p:sldId id="312" r:id="rId12"/>
+    <p:sldId id="313" r:id="rId13"/>
+    <p:sldId id="314" r:id="rId14"/>
+    <p:sldId id="295" r:id="rId15"/>
   </p:sldIdLst>
   <p:sldSz cx="12192000" cy="6858000"/>
   <p:notesSz cx="6858000" cy="9144000"/>
@@ -254,7 +258,7 @@
           <a:p>
             <a:fld id="{4A61891F-26D4-4EED-9BA8-111B4F671ED2}" type="datetimeFigureOut">
               <a:rPr lang="ko-KR" altLang="en-US" smtClean="0"/>
-              <a:t>2017-07-19</a:t>
+              <a:t>2017-07-20</a:t>
             </a:fld>
             <a:endParaRPr lang="ko-KR" altLang="en-US"/>
           </a:p>
@@ -541,7 +545,7 @@
           <a:p>
             <a:fld id="{4A61891F-26D4-4EED-9BA8-111B4F671ED2}" type="datetimeFigureOut">
               <a:rPr lang="ko-KR" altLang="en-US" smtClean="0"/>
-              <a:t>2017-07-19</a:t>
+              <a:t>2017-07-20</a:t>
             </a:fld>
             <a:endParaRPr lang="ko-KR" altLang="en-US"/>
           </a:p>
@@ -733,7 +737,7 @@
           <a:p>
             <a:fld id="{4A61891F-26D4-4EED-9BA8-111B4F671ED2}" type="datetimeFigureOut">
               <a:rPr lang="ko-KR" altLang="en-US" smtClean="0"/>
-              <a:t>2017-07-19</a:t>
+              <a:t>2017-07-20</a:t>
             </a:fld>
             <a:endParaRPr lang="ko-KR" altLang="en-US"/>
           </a:p>
@@ -994,7 +998,7 @@
           <a:p>
             <a:fld id="{4A61891F-26D4-4EED-9BA8-111B4F671ED2}" type="datetimeFigureOut">
               <a:rPr lang="ko-KR" altLang="en-US" smtClean="0"/>
-              <a:t>2017-07-19</a:t>
+              <a:t>2017-07-20</a:t>
             </a:fld>
             <a:endParaRPr lang="ko-KR" altLang="en-US"/>
           </a:p>
@@ -1418,7 +1422,7 @@
           <a:p>
             <a:fld id="{4A61891F-26D4-4EED-9BA8-111B4F671ED2}" type="datetimeFigureOut">
               <a:rPr lang="ko-KR" altLang="en-US" smtClean="0"/>
-              <a:t>2017-07-19</a:t>
+              <a:t>2017-07-20</a:t>
             </a:fld>
             <a:endParaRPr lang="ko-KR" altLang="en-US"/>
           </a:p>
@@ -1964,7 +1968,7 @@
           <a:p>
             <a:fld id="{4A61891F-26D4-4EED-9BA8-111B4F671ED2}" type="datetimeFigureOut">
               <a:rPr lang="ko-KR" altLang="en-US" smtClean="0"/>
-              <a:t>2017-07-19</a:t>
+              <a:t>2017-07-20</a:t>
             </a:fld>
             <a:endParaRPr lang="ko-KR" altLang="en-US"/>
           </a:p>
@@ -2804,7 +2808,7 @@
           <a:p>
             <a:fld id="{4A61891F-26D4-4EED-9BA8-111B4F671ED2}" type="datetimeFigureOut">
               <a:rPr lang="ko-KR" altLang="en-US" smtClean="0"/>
-              <a:t>2017-07-19</a:t>
+              <a:t>2017-07-20</a:t>
             </a:fld>
             <a:endParaRPr lang="ko-KR" altLang="en-US"/>
           </a:p>
@@ -2974,7 +2978,7 @@
           <a:p>
             <a:fld id="{4A61891F-26D4-4EED-9BA8-111B4F671ED2}" type="datetimeFigureOut">
               <a:rPr lang="ko-KR" altLang="en-US" smtClean="0"/>
-              <a:t>2017-07-19</a:t>
+              <a:t>2017-07-20</a:t>
             </a:fld>
             <a:endParaRPr lang="ko-KR" altLang="en-US"/>
           </a:p>
@@ -3158,7 +3162,7 @@
           <a:p>
             <a:fld id="{4A61891F-26D4-4EED-9BA8-111B4F671ED2}" type="datetimeFigureOut">
               <a:rPr lang="ko-KR" altLang="en-US" smtClean="0"/>
-              <a:t>2017-07-19</a:t>
+              <a:t>2017-07-20</a:t>
             </a:fld>
             <a:endParaRPr lang="ko-KR" altLang="en-US"/>
           </a:p>
@@ -3328,7 +3332,7 @@
           <a:p>
             <a:fld id="{4A61891F-26D4-4EED-9BA8-111B4F671ED2}" type="datetimeFigureOut">
               <a:rPr lang="ko-KR" altLang="en-US" smtClean="0"/>
-              <a:t>2017-07-19</a:t>
+              <a:t>2017-07-20</a:t>
             </a:fld>
             <a:endParaRPr lang="ko-KR" altLang="en-US"/>
           </a:p>
@@ -3576,7 +3580,7 @@
           <a:p>
             <a:fld id="{4A61891F-26D4-4EED-9BA8-111B4F671ED2}" type="datetimeFigureOut">
               <a:rPr lang="ko-KR" altLang="en-US" smtClean="0"/>
-              <a:t>2017-07-19</a:t>
+              <a:t>2017-07-20</a:t>
             </a:fld>
             <a:endParaRPr lang="ko-KR" altLang="en-US"/>
           </a:p>
@@ -3813,7 +3817,7 @@
           <a:p>
             <a:fld id="{4A61891F-26D4-4EED-9BA8-111B4F671ED2}" type="datetimeFigureOut">
               <a:rPr lang="ko-KR" altLang="en-US" smtClean="0"/>
-              <a:t>2017-07-19</a:t>
+              <a:t>2017-07-20</a:t>
             </a:fld>
             <a:endParaRPr lang="ko-KR" altLang="en-US"/>
           </a:p>
@@ -4186,7 +4190,7 @@
           <a:p>
             <a:fld id="{4A61891F-26D4-4EED-9BA8-111B4F671ED2}" type="datetimeFigureOut">
               <a:rPr lang="ko-KR" altLang="en-US" smtClean="0"/>
-              <a:t>2017-07-19</a:t>
+              <a:t>2017-07-20</a:t>
             </a:fld>
             <a:endParaRPr lang="ko-KR" altLang="en-US"/>
           </a:p>
@@ -4304,7 +4308,7 @@
           <a:p>
             <a:fld id="{4A61891F-26D4-4EED-9BA8-111B4F671ED2}" type="datetimeFigureOut">
               <a:rPr lang="ko-KR" altLang="en-US" smtClean="0"/>
-              <a:t>2017-07-19</a:t>
+              <a:t>2017-07-20</a:t>
             </a:fld>
             <a:endParaRPr lang="ko-KR" altLang="en-US"/>
           </a:p>
@@ -4399,7 +4403,7 @@
           <a:p>
             <a:fld id="{4A61891F-26D4-4EED-9BA8-111B4F671ED2}" type="datetimeFigureOut">
               <a:rPr lang="ko-KR" altLang="en-US" smtClean="0"/>
-              <a:t>2017-07-19</a:t>
+              <a:t>2017-07-20</a:t>
             </a:fld>
             <a:endParaRPr lang="ko-KR" altLang="en-US"/>
           </a:p>
@@ -4650,7 +4654,7 @@
           <a:p>
             <a:fld id="{4A61891F-26D4-4EED-9BA8-111B4F671ED2}" type="datetimeFigureOut">
               <a:rPr lang="ko-KR" altLang="en-US" smtClean="0"/>
-              <a:t>2017-07-19</a:t>
+              <a:t>2017-07-20</a:t>
             </a:fld>
             <a:endParaRPr lang="ko-KR" altLang="en-US"/>
           </a:p>
@@ -4937,7 +4941,7 @@
           <a:p>
             <a:fld id="{4A61891F-26D4-4EED-9BA8-111B4F671ED2}" type="datetimeFigureOut">
               <a:rPr lang="ko-KR" altLang="en-US" smtClean="0"/>
-              <a:t>2017-07-19</a:t>
+              <a:t>2017-07-20</a:t>
             </a:fld>
             <a:endParaRPr lang="ko-KR" altLang="en-US"/>
           </a:p>
@@ -5150,7 +5154,7 @@
           <a:p>
             <a:fld id="{4A61891F-26D4-4EED-9BA8-111B4F671ED2}" type="datetimeFigureOut">
               <a:rPr lang="ko-KR" altLang="en-US" smtClean="0"/>
-              <a:t>2017-07-19</a:t>
+              <a:t>2017-07-20</a:t>
             </a:fld>
             <a:endParaRPr lang="ko-KR" altLang="en-US"/>
           </a:p>
@@ -5755,6 +5759,883 @@
             <p:ph type="title"/>
           </p:nvPr>
         </p:nvSpPr>
+        <p:spPr>
+          <a:xfrm>
+            <a:off x="913795" y="590145"/>
+            <a:ext cx="10353761" cy="1326321"/>
+          </a:xfrm>
+        </p:spPr>
+        <p:txBody>
+          <a:bodyPr/>
+          <a:lstStyle/>
+          <a:p>
+            <a:r>
+              <a:rPr lang="ko-KR" altLang="en-US" dirty="0" smtClean="0"/>
+              <a:t>변수와 타입</a:t>
+            </a:r>
+            <a:endParaRPr lang="ko-KR" altLang="en-US" dirty="0"/>
+          </a:p>
+        </p:txBody>
+      </p:sp>
+      <p:sp>
+        <p:nvSpPr>
+          <p:cNvPr id="6" name="내용 개체 틀 3"/>
+          <p:cNvSpPr>
+            <a:spLocks noGrp="1"/>
+          </p:cNvSpPr>
+          <p:nvPr>
+            <p:ph idx="1"/>
+          </p:nvPr>
+        </p:nvSpPr>
+        <p:spPr>
+          <a:xfrm>
+            <a:off x="838200" y="1833790"/>
+            <a:ext cx="10429356" cy="4351338"/>
+          </a:xfrm>
+        </p:spPr>
+        <p:txBody>
+          <a:bodyPr>
+            <a:normAutofit/>
+          </a:bodyPr>
+          <a:lstStyle/>
+          <a:p>
+            <a:r>
+              <a:rPr lang="en-US" altLang="ko-KR" dirty="0" smtClean="0"/>
+              <a:t>Python </a:t>
+            </a:r>
+            <a:r>
+              <a:rPr lang="ko-KR" altLang="en-US" dirty="0" smtClean="0"/>
+              <a:t>타입의 종류</a:t>
+            </a:r>
+            <a:endParaRPr lang="en-US" altLang="ko-KR" dirty="0"/>
+          </a:p>
+          <a:p>
+            <a:pPr lvl="1"/>
+            <a:r>
+              <a:rPr lang="ko-KR" altLang="en-US" dirty="0" smtClean="0"/>
+              <a:t>정수</a:t>
+            </a:r>
+            <a:endParaRPr lang="en-US" altLang="ko-KR" dirty="0" smtClean="0"/>
+          </a:p>
+          <a:p>
+            <a:pPr lvl="1"/>
+            <a:r>
+              <a:rPr lang="ko-KR" altLang="en-US" dirty="0" smtClean="0"/>
+              <a:t>실수</a:t>
+            </a:r>
+            <a:endParaRPr lang="en-US" altLang="ko-KR" dirty="0" smtClean="0"/>
+          </a:p>
+          <a:p>
+            <a:pPr lvl="1"/>
+            <a:r>
+              <a:rPr lang="ko-KR" altLang="en-US" dirty="0" smtClean="0"/>
+              <a:t>문자열</a:t>
+            </a:r>
+            <a:endParaRPr lang="en-US" altLang="ko-KR" dirty="0" smtClean="0"/>
+          </a:p>
+          <a:p>
+            <a:pPr lvl="1"/>
+            <a:r>
+              <a:rPr lang="en-US" altLang="ko-KR" dirty="0" smtClean="0"/>
+              <a:t>Boolean(True or False)</a:t>
+            </a:r>
+          </a:p>
+          <a:p>
+            <a:pPr lvl="1"/>
+            <a:r>
+              <a:rPr lang="ko-KR" altLang="en-US" dirty="0" smtClean="0"/>
+              <a:t>리스트</a:t>
+            </a:r>
+            <a:endParaRPr lang="en-US" altLang="ko-KR" dirty="0" smtClean="0"/>
+          </a:p>
+          <a:p>
+            <a:pPr lvl="1"/>
+            <a:r>
+              <a:rPr lang="ko-KR" altLang="en-US" dirty="0" smtClean="0"/>
+              <a:t>사전</a:t>
+            </a:r>
+            <a:endParaRPr lang="en-US" altLang="ko-KR" dirty="0" smtClean="0"/>
+          </a:p>
+          <a:p>
+            <a:pPr lvl="1"/>
+            <a:r>
+              <a:rPr lang="en-US" altLang="ko-KR" dirty="0" smtClean="0"/>
+              <a:t>Etc.</a:t>
+            </a:r>
+            <a:endParaRPr lang="en-US" altLang="ko-KR" dirty="0"/>
+          </a:p>
+        </p:txBody>
+      </p:sp>
+      <p:pic>
+        <p:nvPicPr>
+          <p:cNvPr id="3" name="그림 2"/>
+          <p:cNvPicPr>
+            <a:picLocks noChangeAspect="1"/>
+          </p:cNvPicPr>
+          <p:nvPr/>
+        </p:nvPicPr>
+        <p:blipFill rotWithShape="1">
+          <a:blip r:embed="rId2"/>
+          <a:srcRect l="27115" t="14528" r="59181" b="71991"/>
+          <a:stretch/>
+        </p:blipFill>
+        <p:spPr>
+          <a:xfrm>
+            <a:off x="4351564" y="1833790"/>
+            <a:ext cx="3670476" cy="2134000"/>
+          </a:xfrm>
+          <a:prstGeom prst="rect">
+            <a:avLst/>
+          </a:prstGeom>
+        </p:spPr>
+      </p:pic>
+      <p:pic>
+        <p:nvPicPr>
+          <p:cNvPr id="4" name="그림 3"/>
+          <p:cNvPicPr>
+            <a:picLocks noChangeAspect="1"/>
+          </p:cNvPicPr>
+          <p:nvPr/>
+        </p:nvPicPr>
+        <p:blipFill rotWithShape="1">
+          <a:blip r:embed="rId3"/>
+          <a:srcRect l="5810" t="68756" r="81707" b="17055"/>
+          <a:stretch/>
+        </p:blipFill>
+        <p:spPr>
+          <a:xfrm>
+            <a:off x="8090807" y="1833789"/>
+            <a:ext cx="3176749" cy="2134001"/>
+          </a:xfrm>
+          <a:prstGeom prst="rect">
+            <a:avLst/>
+          </a:prstGeom>
+        </p:spPr>
+      </p:pic>
+    </p:spTree>
+    <p:extLst>
+      <p:ext uri="{BB962C8B-B14F-4D97-AF65-F5344CB8AC3E}">
+        <p14:creationId xmlns:p14="http://schemas.microsoft.com/office/powerpoint/2010/main" val="2153128656"/>
+      </p:ext>
+    </p:extLst>
+  </p:cSld>
+  <p:clrMapOvr>
+    <a:masterClrMapping/>
+  </p:clrMapOvr>
+  <p:timing>
+    <p:tnLst>
+      <p:par>
+        <p:cTn id="1" dur="indefinite" restart="never" nodeType="tmRoot"/>
+      </p:par>
+    </p:tnLst>
+  </p:timing>
+</p:sld>
+</file>
+
+<file path=ppt/slides/slide11.xml><?xml version="1.0" encoding="utf-8"?>
+<p:sld xmlns:a="http://schemas.openxmlformats.org/drawingml/2006/main" xmlns:r="http://schemas.openxmlformats.org/officeDocument/2006/relationships" xmlns:p="http://schemas.openxmlformats.org/presentationml/2006/main">
+  <p:cSld>
+    <p:spTree>
+      <p:nvGrpSpPr>
+        <p:cNvPr id="1" name=""/>
+        <p:cNvGrpSpPr/>
+        <p:nvPr/>
+      </p:nvGrpSpPr>
+      <p:grpSpPr>
+        <a:xfrm>
+          <a:off x="0" y="0"/>
+          <a:ext cx="0" cy="0"/>
+          <a:chOff x="0" y="0"/>
+          <a:chExt cx="0" cy="0"/>
+        </a:xfrm>
+      </p:grpSpPr>
+      <p:sp>
+        <p:nvSpPr>
+          <p:cNvPr id="2" name="제목 1"/>
+          <p:cNvSpPr>
+            <a:spLocks noGrp="1"/>
+          </p:cNvSpPr>
+          <p:nvPr>
+            <p:ph type="title"/>
+          </p:nvPr>
+        </p:nvSpPr>
+        <p:spPr>
+          <a:xfrm>
+            <a:off x="913795" y="590145"/>
+            <a:ext cx="10353761" cy="1326321"/>
+          </a:xfrm>
+        </p:spPr>
+        <p:txBody>
+          <a:bodyPr/>
+          <a:lstStyle/>
+          <a:p>
+            <a:r>
+              <a:rPr lang="ko-KR" altLang="en-US" dirty="0" smtClean="0"/>
+              <a:t>변수와 타입</a:t>
+            </a:r>
+            <a:endParaRPr lang="ko-KR" altLang="en-US" dirty="0"/>
+          </a:p>
+        </p:txBody>
+      </p:sp>
+      <p:sp>
+        <p:nvSpPr>
+          <p:cNvPr id="6" name="내용 개체 틀 3"/>
+          <p:cNvSpPr>
+            <a:spLocks noGrp="1"/>
+          </p:cNvSpPr>
+          <p:nvPr>
+            <p:ph idx="1"/>
+          </p:nvPr>
+        </p:nvSpPr>
+        <p:spPr>
+          <a:xfrm>
+            <a:off x="838200" y="1833790"/>
+            <a:ext cx="10429356" cy="4351338"/>
+          </a:xfrm>
+        </p:spPr>
+        <p:txBody>
+          <a:bodyPr>
+            <a:normAutofit/>
+          </a:bodyPr>
+          <a:lstStyle/>
+          <a:p>
+            <a:r>
+              <a:rPr lang="ko-KR" altLang="en-US" dirty="0" smtClean="0"/>
+              <a:t>변수</a:t>
+            </a:r>
+            <a:endParaRPr lang="en-US" altLang="ko-KR" dirty="0"/>
+          </a:p>
+          <a:p>
+            <a:pPr lvl="1"/>
+            <a:r>
+              <a:rPr lang="ko-KR" altLang="en-US" dirty="0" smtClean="0"/>
+              <a:t>어떠한</a:t>
+            </a:r>
+            <a:r>
+              <a:rPr lang="ko-KR" altLang="en-US" dirty="0" smtClean="0"/>
+              <a:t> 수를 담을 공간</a:t>
+            </a:r>
+            <a:endParaRPr lang="en-US" altLang="ko-KR" dirty="0" smtClean="0"/>
+          </a:p>
+          <a:p>
+            <a:pPr lvl="1"/>
+            <a:r>
+              <a:rPr lang="ko-KR" altLang="en-US" dirty="0" smtClean="0"/>
+              <a:t>수학에서의 미지수와 비슷한 역할</a:t>
+            </a:r>
+            <a:endParaRPr lang="en-US" altLang="ko-KR" dirty="0" smtClean="0"/>
+          </a:p>
+          <a:p>
+            <a:r>
+              <a:rPr lang="en-US" altLang="ko-KR" dirty="0" err="1"/>
+              <a:t>E</a:t>
+            </a:r>
+            <a:r>
+              <a:rPr lang="en-US" altLang="ko-KR" dirty="0" err="1" smtClean="0"/>
+              <a:t>.g</a:t>
+            </a:r>
+            <a:r>
+              <a:rPr lang="en-US" altLang="ko-KR" dirty="0" smtClean="0"/>
+              <a:t>) f(x) = x + 1</a:t>
+            </a:r>
+          </a:p>
+          <a:p>
+            <a:pPr lvl="1"/>
+            <a:r>
+              <a:rPr lang="ko-KR" altLang="en-US" dirty="0" smtClean="0"/>
+              <a:t>수학에서는 </a:t>
+            </a:r>
+            <a:r>
+              <a:rPr lang="en-US" altLang="ko-KR" dirty="0" smtClean="0"/>
+              <a:t>x</a:t>
+            </a:r>
+            <a:r>
+              <a:rPr lang="ko-KR" altLang="en-US" dirty="0" smtClean="0"/>
+              <a:t>를 미지수라고 부릅니다</a:t>
+            </a:r>
+            <a:r>
+              <a:rPr lang="en-US" altLang="ko-KR" dirty="0" smtClean="0"/>
+              <a:t>.</a:t>
+            </a:r>
+          </a:p>
+          <a:p>
+            <a:pPr lvl="1"/>
+            <a:r>
+              <a:rPr lang="ko-KR" altLang="en-US" dirty="0" smtClean="0"/>
+              <a:t>컴퓨터에서는 미지수 그 자체로 값을 처리할 수 없습니다</a:t>
+            </a:r>
+            <a:r>
+              <a:rPr lang="en-US" altLang="ko-KR" dirty="0" smtClean="0"/>
+              <a:t>.</a:t>
+            </a:r>
+          </a:p>
+          <a:p>
+            <a:pPr lvl="1"/>
+            <a:r>
+              <a:rPr lang="ko-KR" altLang="en-US" dirty="0" smtClean="0"/>
+              <a:t>실제 값을 넣어볼 수 있도록 변수라는 개념을 만든 것입니다</a:t>
+            </a:r>
+            <a:r>
+              <a:rPr lang="en-US" altLang="ko-KR" dirty="0" smtClean="0"/>
+              <a:t>.</a:t>
+            </a:r>
+            <a:endParaRPr lang="en-US" altLang="ko-KR" dirty="0"/>
+          </a:p>
+        </p:txBody>
+      </p:sp>
+    </p:spTree>
+    <p:extLst>
+      <p:ext uri="{BB962C8B-B14F-4D97-AF65-F5344CB8AC3E}">
+        <p14:creationId xmlns:p14="http://schemas.microsoft.com/office/powerpoint/2010/main" val="256526864"/>
+      </p:ext>
+    </p:extLst>
+  </p:cSld>
+  <p:clrMapOvr>
+    <a:masterClrMapping/>
+  </p:clrMapOvr>
+  <p:timing>
+    <p:tnLst>
+      <p:par>
+        <p:cTn id="1" dur="indefinite" restart="never" nodeType="tmRoot"/>
+      </p:par>
+    </p:tnLst>
+  </p:timing>
+</p:sld>
+</file>
+
+<file path=ppt/slides/slide12.xml><?xml version="1.0" encoding="utf-8"?>
+<p:sld xmlns:a="http://schemas.openxmlformats.org/drawingml/2006/main" xmlns:r="http://schemas.openxmlformats.org/officeDocument/2006/relationships" xmlns:p="http://schemas.openxmlformats.org/presentationml/2006/main">
+  <p:cSld>
+    <p:spTree>
+      <p:nvGrpSpPr>
+        <p:cNvPr id="1" name=""/>
+        <p:cNvGrpSpPr/>
+        <p:nvPr/>
+      </p:nvGrpSpPr>
+      <p:grpSpPr>
+        <a:xfrm>
+          <a:off x="0" y="0"/>
+          <a:ext cx="0" cy="0"/>
+          <a:chOff x="0" y="0"/>
+          <a:chExt cx="0" cy="0"/>
+        </a:xfrm>
+      </p:grpSpPr>
+      <p:sp>
+        <p:nvSpPr>
+          <p:cNvPr id="2" name="제목 1"/>
+          <p:cNvSpPr>
+            <a:spLocks noGrp="1"/>
+          </p:cNvSpPr>
+          <p:nvPr>
+            <p:ph type="title"/>
+          </p:nvPr>
+        </p:nvSpPr>
+        <p:spPr>
+          <a:xfrm>
+            <a:off x="913795" y="590145"/>
+            <a:ext cx="10353761" cy="1326321"/>
+          </a:xfrm>
+        </p:spPr>
+        <p:txBody>
+          <a:bodyPr/>
+          <a:lstStyle/>
+          <a:p>
+            <a:r>
+              <a:rPr lang="ko-KR" altLang="en-US" dirty="0" smtClean="0"/>
+              <a:t>변수와 타입</a:t>
+            </a:r>
+            <a:endParaRPr lang="ko-KR" altLang="en-US" dirty="0"/>
+          </a:p>
+        </p:txBody>
+      </p:sp>
+      <p:sp>
+        <p:nvSpPr>
+          <p:cNvPr id="6" name="내용 개체 틀 3"/>
+          <p:cNvSpPr>
+            <a:spLocks noGrp="1"/>
+          </p:cNvSpPr>
+          <p:nvPr>
+            <p:ph idx="1"/>
+          </p:nvPr>
+        </p:nvSpPr>
+        <p:spPr>
+          <a:xfrm>
+            <a:off x="838200" y="1833790"/>
+            <a:ext cx="10429356" cy="4351338"/>
+          </a:xfrm>
+        </p:spPr>
+        <p:txBody>
+          <a:bodyPr>
+            <a:normAutofit/>
+          </a:bodyPr>
+          <a:lstStyle/>
+          <a:p>
+            <a:r>
+              <a:rPr lang="ko-KR" altLang="en-US" dirty="0" smtClean="0"/>
+              <a:t>변수 사용 방법</a:t>
+            </a:r>
+            <a:endParaRPr lang="en-US" altLang="ko-KR" dirty="0" smtClean="0"/>
+          </a:p>
+          <a:p>
+            <a:pPr lvl="1"/>
+            <a:r>
+              <a:rPr lang="en-US" altLang="ko-KR" dirty="0" smtClean="0"/>
+              <a:t>[</a:t>
+            </a:r>
+            <a:r>
+              <a:rPr lang="ko-KR" altLang="en-US" dirty="0" smtClean="0"/>
+              <a:t>변수 이름</a:t>
+            </a:r>
+            <a:r>
+              <a:rPr lang="en-US" altLang="ko-KR" dirty="0" smtClean="0"/>
+              <a:t>] = [</a:t>
+            </a:r>
+            <a:r>
+              <a:rPr lang="ko-KR" altLang="en-US" dirty="0" smtClean="0"/>
+              <a:t>변수에 대입할 값</a:t>
+            </a:r>
+            <a:r>
+              <a:rPr lang="en-US" altLang="ko-KR" dirty="0" smtClean="0"/>
+              <a:t>]</a:t>
+            </a:r>
+          </a:p>
+          <a:p>
+            <a:pPr lvl="1"/>
+            <a:r>
+              <a:rPr lang="ko-KR" altLang="en-US" dirty="0" smtClean="0"/>
+              <a:t>여기서 </a:t>
+            </a:r>
+            <a:r>
+              <a:rPr lang="en-US" altLang="ko-KR" dirty="0" smtClean="0"/>
+              <a:t>‘=’</a:t>
+            </a:r>
+            <a:r>
+              <a:rPr lang="ko-KR" altLang="en-US" dirty="0" smtClean="0"/>
+              <a:t>는 수학에서의 </a:t>
+            </a:r>
+            <a:r>
+              <a:rPr lang="en-US" altLang="ko-KR" dirty="0" smtClean="0"/>
+              <a:t>‘</a:t>
+            </a:r>
+            <a:r>
+              <a:rPr lang="ko-KR" altLang="en-US" dirty="0" smtClean="0"/>
+              <a:t>같다</a:t>
+            </a:r>
+            <a:r>
+              <a:rPr lang="en-US" altLang="ko-KR" dirty="0" smtClean="0"/>
+              <a:t>’</a:t>
+            </a:r>
+            <a:r>
+              <a:rPr lang="ko-KR" altLang="en-US" dirty="0" smtClean="0"/>
+              <a:t>라는 뜻과 다릅니다</a:t>
+            </a:r>
+            <a:r>
+              <a:rPr lang="en-US" altLang="ko-KR" dirty="0" smtClean="0"/>
+              <a:t>.</a:t>
+            </a:r>
+          </a:p>
+          <a:p>
+            <a:pPr lvl="1"/>
+            <a:r>
+              <a:rPr lang="ko-KR" altLang="en-US" dirty="0" smtClean="0"/>
+              <a:t>단순히 대입의 의미로만 사용됩니다</a:t>
+            </a:r>
+            <a:r>
+              <a:rPr lang="en-US" altLang="ko-KR" dirty="0" smtClean="0"/>
+              <a:t>.</a:t>
+            </a:r>
+            <a:endParaRPr lang="en-US" altLang="ko-KR" dirty="0"/>
+          </a:p>
+        </p:txBody>
+      </p:sp>
+      <p:pic>
+        <p:nvPicPr>
+          <p:cNvPr id="3" name="그림 2"/>
+          <p:cNvPicPr>
+            <a:picLocks noChangeAspect="1"/>
+          </p:cNvPicPr>
+          <p:nvPr/>
+        </p:nvPicPr>
+        <p:blipFill rotWithShape="1">
+          <a:blip r:embed="rId2"/>
+          <a:srcRect l="30564" t="14243" r="52569" b="74103"/>
+          <a:stretch/>
+        </p:blipFill>
+        <p:spPr>
+          <a:xfrm>
+            <a:off x="6702878" y="1833790"/>
+            <a:ext cx="4564677" cy="1863913"/>
+          </a:xfrm>
+          <a:prstGeom prst="rect">
+            <a:avLst/>
+          </a:prstGeom>
+        </p:spPr>
+      </p:pic>
+      <p:pic>
+        <p:nvPicPr>
+          <p:cNvPr id="4" name="그림 3"/>
+          <p:cNvPicPr>
+            <a:picLocks noChangeAspect="1"/>
+          </p:cNvPicPr>
+          <p:nvPr/>
+        </p:nvPicPr>
+        <p:blipFill rotWithShape="1">
+          <a:blip r:embed="rId3"/>
+          <a:srcRect l="5449" t="68219" r="81907" b="20446"/>
+          <a:stretch/>
+        </p:blipFill>
+        <p:spPr>
+          <a:xfrm>
+            <a:off x="6702878" y="3724225"/>
+            <a:ext cx="4564677" cy="2418371"/>
+          </a:xfrm>
+          <a:prstGeom prst="rect">
+            <a:avLst/>
+          </a:prstGeom>
+        </p:spPr>
+      </p:pic>
+    </p:spTree>
+    <p:extLst>
+      <p:ext uri="{BB962C8B-B14F-4D97-AF65-F5344CB8AC3E}">
+        <p14:creationId xmlns:p14="http://schemas.microsoft.com/office/powerpoint/2010/main" val="1409785286"/>
+      </p:ext>
+    </p:extLst>
+  </p:cSld>
+  <p:clrMapOvr>
+    <a:masterClrMapping/>
+  </p:clrMapOvr>
+  <p:timing>
+    <p:tnLst>
+      <p:par>
+        <p:cTn id="1" dur="indefinite" restart="never" nodeType="tmRoot"/>
+      </p:par>
+    </p:tnLst>
+  </p:timing>
+</p:sld>
+</file>
+
+<file path=ppt/slides/slide13.xml><?xml version="1.0" encoding="utf-8"?>
+<p:sld xmlns:a="http://schemas.openxmlformats.org/drawingml/2006/main" xmlns:r="http://schemas.openxmlformats.org/officeDocument/2006/relationships" xmlns:p="http://schemas.openxmlformats.org/presentationml/2006/main">
+  <p:cSld>
+    <p:spTree>
+      <p:nvGrpSpPr>
+        <p:cNvPr id="1" name=""/>
+        <p:cNvGrpSpPr/>
+        <p:nvPr/>
+      </p:nvGrpSpPr>
+      <p:grpSpPr>
+        <a:xfrm>
+          <a:off x="0" y="0"/>
+          <a:ext cx="0" cy="0"/>
+          <a:chOff x="0" y="0"/>
+          <a:chExt cx="0" cy="0"/>
+        </a:xfrm>
+      </p:grpSpPr>
+      <p:sp>
+        <p:nvSpPr>
+          <p:cNvPr id="2" name="제목 1"/>
+          <p:cNvSpPr>
+            <a:spLocks noGrp="1"/>
+          </p:cNvSpPr>
+          <p:nvPr>
+            <p:ph type="title"/>
+          </p:nvPr>
+        </p:nvSpPr>
+        <p:spPr>
+          <a:xfrm>
+            <a:off x="913795" y="590145"/>
+            <a:ext cx="10353761" cy="1326321"/>
+          </a:xfrm>
+        </p:spPr>
+        <p:txBody>
+          <a:bodyPr/>
+          <a:lstStyle/>
+          <a:p>
+            <a:r>
+              <a:rPr lang="ko-KR" altLang="en-US" dirty="0" smtClean="0"/>
+              <a:t>연습</a:t>
+            </a:r>
+            <a:r>
+              <a:rPr lang="en-US" altLang="ko-KR" dirty="0" smtClean="0"/>
+              <a:t>1. </a:t>
+            </a:r>
+            <a:r>
+              <a:rPr lang="ko-KR" altLang="en-US" dirty="0" smtClean="0"/>
+              <a:t>간단한 식을 세우고 </a:t>
+            </a:r>
+            <a:r>
+              <a:rPr lang="ko-KR" altLang="en-US" dirty="0" err="1" smtClean="0"/>
+              <a:t>코딩해보자</a:t>
+            </a:r>
+            <a:r>
+              <a:rPr lang="en-US" altLang="ko-KR" dirty="0" smtClean="0"/>
+              <a:t>.</a:t>
+            </a:r>
+            <a:endParaRPr lang="ko-KR" altLang="en-US" dirty="0"/>
+          </a:p>
+        </p:txBody>
+      </p:sp>
+      <mc:AlternateContent xmlns:mc="http://schemas.openxmlformats.org/markup-compatibility/2006">
+        <mc:Choice xmlns:a14="http://schemas.microsoft.com/office/drawing/2010/main" Requires="a14">
+          <p:sp>
+            <p:nvSpPr>
+              <p:cNvPr id="6" name="내용 개체 틀 3"/>
+              <p:cNvSpPr>
+                <a:spLocks noGrp="1"/>
+              </p:cNvSpPr>
+              <p:nvPr>
+                <p:ph idx="1"/>
+              </p:nvPr>
+            </p:nvSpPr>
+            <p:spPr>
+              <a:xfrm>
+                <a:off x="838200" y="1833790"/>
+                <a:ext cx="10429356" cy="4351338"/>
+              </a:xfrm>
+            </p:spPr>
+            <p:txBody>
+              <a:bodyPr>
+                <a:normAutofit/>
+              </a:bodyPr>
+              <a:lstStyle/>
+              <a:p>
+                <a:r>
+                  <a:rPr lang="ko-KR" altLang="en-US" dirty="0" smtClean="0"/>
+                  <a:t>지금까지 배운 변수</a:t>
+                </a:r>
+                <a:r>
+                  <a:rPr lang="en-US" altLang="ko-KR" dirty="0" smtClean="0"/>
+                  <a:t>, </a:t>
+                </a:r>
+                <a:r>
+                  <a:rPr lang="ko-KR" altLang="en-US" dirty="0" smtClean="0"/>
+                  <a:t>연산</a:t>
+                </a:r>
+                <a:r>
+                  <a:rPr lang="en-US" altLang="ko-KR" dirty="0" smtClean="0"/>
+                  <a:t>, </a:t>
+                </a:r>
+                <a:r>
+                  <a:rPr lang="ko-KR" altLang="en-US" dirty="0" err="1" smtClean="0"/>
+                  <a:t>출력문을</a:t>
+                </a:r>
+                <a:r>
+                  <a:rPr lang="ko-KR" altLang="en-US" dirty="0" smtClean="0"/>
+                  <a:t> 이용해서 식을 세워 결과 값을 출력해봅시다</a:t>
+                </a:r>
+                <a:r>
+                  <a:rPr lang="en-US" altLang="ko-KR" dirty="0" smtClean="0"/>
+                  <a:t>.</a:t>
+                </a:r>
+              </a:p>
+              <a:p>
+                <a:r>
+                  <a:rPr lang="en-US" altLang="ko-KR" dirty="0" err="1" smtClean="0"/>
+                  <a:t>E.g</a:t>
+                </a:r>
+                <a:r>
+                  <a:rPr lang="en-US" altLang="ko-KR" dirty="0" smtClean="0"/>
+                  <a:t>) </a:t>
+                </a:r>
+                <a14:m>
+                  <m:oMath xmlns:m="http://schemas.openxmlformats.org/officeDocument/2006/math">
+                    <m:sSup>
+                      <m:sSupPr>
+                        <m:ctrlPr>
+                          <a:rPr lang="en-US" altLang="ko-KR" i="1" smtClean="0">
+                            <a:latin typeface="Cambria Math" panose="02040503050406030204" pitchFamily="18" charset="0"/>
+                          </a:rPr>
+                        </m:ctrlPr>
+                      </m:sSupPr>
+                      <m:e>
+                        <m:r>
+                          <a:rPr lang="en-US" altLang="ko-KR" b="0" i="1" smtClean="0">
+                            <a:latin typeface="Cambria Math" panose="02040503050406030204" pitchFamily="18" charset="0"/>
+                          </a:rPr>
+                          <m:t>𝑥</m:t>
+                        </m:r>
+                      </m:e>
+                      <m:sup>
+                        <m:r>
+                          <a:rPr lang="en-US" altLang="ko-KR" b="0" i="1" smtClean="0">
+                            <a:latin typeface="Cambria Math" panose="02040503050406030204" pitchFamily="18" charset="0"/>
+                          </a:rPr>
+                          <m:t>2</m:t>
+                        </m:r>
+                      </m:sup>
+                    </m:sSup>
+                    <m:r>
+                      <a:rPr lang="en-US" altLang="ko-KR" b="0" i="1" smtClean="0">
+                        <a:latin typeface="Cambria Math" panose="02040503050406030204" pitchFamily="18" charset="0"/>
+                      </a:rPr>
+                      <m:t>+2</m:t>
+                    </m:r>
+                    <m:r>
+                      <a:rPr lang="en-US" altLang="ko-KR" b="0" i="1" smtClean="0">
+                        <a:latin typeface="Cambria Math" panose="02040503050406030204" pitchFamily="18" charset="0"/>
+                      </a:rPr>
+                      <m:t>𝑥</m:t>
+                    </m:r>
+                    <m:r>
+                      <a:rPr lang="en-US" altLang="ko-KR" b="0" i="1" smtClean="0">
+                        <a:latin typeface="Cambria Math" panose="02040503050406030204" pitchFamily="18" charset="0"/>
+                      </a:rPr>
+                      <m:t>+1</m:t>
+                    </m:r>
+                  </m:oMath>
+                </a14:m>
+                <a:r>
+                  <a:rPr lang="ko-KR" altLang="en-US" dirty="0" smtClean="0"/>
+                  <a:t>을</a:t>
+                </a:r>
+                <a:r>
+                  <a:rPr lang="en-US" altLang="ko-KR" dirty="0" smtClean="0"/>
+                  <a:t> </a:t>
+                </a:r>
+                <a:r>
+                  <a:rPr lang="ko-KR" altLang="en-US" dirty="0" smtClean="0"/>
+                  <a:t>계산하여 출력해봅시다</a:t>
+                </a:r>
+                <a:r>
+                  <a:rPr lang="en-US" altLang="ko-KR" dirty="0" smtClean="0"/>
+                  <a:t>.</a:t>
+                </a:r>
+                <a:endParaRPr lang="en-US" altLang="ko-KR" dirty="0"/>
+              </a:p>
+            </p:txBody>
+          </p:sp>
+        </mc:Choice>
+        <mc:Fallback>
+          <p:sp>
+            <p:nvSpPr>
+              <p:cNvPr id="6" name="내용 개체 틀 3"/>
+              <p:cNvSpPr>
+                <a:spLocks noGrp="1" noRot="1" noChangeAspect="1" noMove="1" noResize="1" noEditPoints="1" noAdjustHandles="1" noChangeArrowheads="1" noChangeShapeType="1" noTextEdit="1"/>
+              </p:cNvSpPr>
+              <p:nvPr>
+                <p:ph idx="1"/>
+              </p:nvPr>
+            </p:nvSpPr>
+            <p:spPr>
+              <a:xfrm>
+                <a:off x="838200" y="1833790"/>
+                <a:ext cx="10429356" cy="4351338"/>
+              </a:xfrm>
+              <a:blipFill rotWithShape="0">
+                <a:blip r:embed="rId2"/>
+                <a:stretch>
+                  <a:fillRect l="-643" t="-420"/>
+                </a:stretch>
+              </a:blipFill>
+            </p:spPr>
+            <p:txBody>
+              <a:bodyPr/>
+              <a:lstStyle/>
+              <a:p>
+                <a:r>
+                  <a:rPr lang="ko-KR" altLang="en-US">
+                    <a:noFill/>
+                  </a:rPr>
+                  <a:t> </a:t>
+                </a:r>
+              </a:p>
+            </p:txBody>
+          </p:sp>
+        </mc:Fallback>
+      </mc:AlternateContent>
+      <p:pic>
+        <p:nvPicPr>
+          <p:cNvPr id="5" name="그림 4"/>
+          <p:cNvPicPr>
+            <a:picLocks noChangeAspect="1"/>
+          </p:cNvPicPr>
+          <p:nvPr/>
+        </p:nvPicPr>
+        <p:blipFill rotWithShape="1">
+          <a:blip r:embed="rId3"/>
+          <a:srcRect l="30702" t="15053" r="58185" b="76336"/>
+          <a:stretch/>
+        </p:blipFill>
+        <p:spPr>
+          <a:xfrm>
+            <a:off x="913795" y="2760060"/>
+            <a:ext cx="4598498" cy="2105853"/>
+          </a:xfrm>
+          <a:prstGeom prst="rect">
+            <a:avLst/>
+          </a:prstGeom>
+        </p:spPr>
+      </p:pic>
+      <p:pic>
+        <p:nvPicPr>
+          <p:cNvPr id="7" name="그림 6"/>
+          <p:cNvPicPr>
+            <a:picLocks noChangeAspect="1"/>
+          </p:cNvPicPr>
+          <p:nvPr/>
+        </p:nvPicPr>
+        <p:blipFill rotWithShape="1">
+          <a:blip r:embed="rId3"/>
+          <a:srcRect l="5645" t="68084" r="81996" b="22954"/>
+          <a:stretch/>
+        </p:blipFill>
+        <p:spPr>
+          <a:xfrm>
+            <a:off x="5512293" y="2760059"/>
+            <a:ext cx="4913664" cy="2105853"/>
+          </a:xfrm>
+          <a:prstGeom prst="rect">
+            <a:avLst/>
+          </a:prstGeom>
+        </p:spPr>
+      </p:pic>
+    </p:spTree>
+    <p:extLst>
+      <p:ext uri="{BB962C8B-B14F-4D97-AF65-F5344CB8AC3E}">
+        <p14:creationId xmlns:p14="http://schemas.microsoft.com/office/powerpoint/2010/main" val="1198375358"/>
+      </p:ext>
+    </p:extLst>
+  </p:cSld>
+  <p:clrMapOvr>
+    <a:masterClrMapping/>
+  </p:clrMapOvr>
+  <p:timing>
+    <p:tnLst>
+      <p:par>
+        <p:cTn id="1" dur="indefinite" restart="never" nodeType="tmRoot"/>
+      </p:par>
+    </p:tnLst>
+  </p:timing>
+</p:sld>
+</file>
+
+<file path=ppt/slides/slide14.xml><?xml version="1.0" encoding="utf-8"?>
+<p:sld xmlns:a="http://schemas.openxmlformats.org/drawingml/2006/main" xmlns:r="http://schemas.openxmlformats.org/officeDocument/2006/relationships" xmlns:p="http://schemas.openxmlformats.org/presentationml/2006/main">
+  <p:cSld>
+    <p:spTree>
+      <p:nvGrpSpPr>
+        <p:cNvPr id="1" name=""/>
+        <p:cNvGrpSpPr/>
+        <p:nvPr/>
+      </p:nvGrpSpPr>
+      <p:grpSpPr>
+        <a:xfrm>
+          <a:off x="0" y="0"/>
+          <a:ext cx="0" cy="0"/>
+          <a:chOff x="0" y="0"/>
+          <a:chExt cx="0" cy="0"/>
+        </a:xfrm>
+      </p:grpSpPr>
+      <p:sp>
+        <p:nvSpPr>
+          <p:cNvPr id="2" name="제목 1"/>
+          <p:cNvSpPr>
+            <a:spLocks noGrp="1"/>
+          </p:cNvSpPr>
+          <p:nvPr>
+            <p:ph type="title"/>
+          </p:nvPr>
+        </p:nvSpPr>
         <p:spPr/>
         <p:txBody>
           <a:bodyPr/>
@@ -6454,25 +7335,15 @@
             <a:pPr lvl="1"/>
             <a:r>
               <a:rPr lang="en-US" altLang="ko-KR" dirty="0" smtClean="0"/>
-              <a:t>CPU: </a:t>
-            </a:r>
+              <a:t>CPU: Intel i3-4130 3.40GHz * 4 cores</a:t>
+            </a:r>
+          </a:p>
+          <a:p>
+            <a:pPr lvl="1"/>
             <a:r>
               <a:rPr lang="en-US" altLang="ko-KR" dirty="0" smtClean="0"/>
-              <a:t>Intel i3-4130 3.40GHz * 4 cores</a:t>
-            </a:r>
-            <a:endParaRPr lang="en-US" altLang="ko-KR" dirty="0" smtClean="0"/>
-          </a:p>
-          <a:p>
-            <a:pPr lvl="1"/>
-            <a:r>
-              <a:rPr lang="en-US" altLang="ko-KR" dirty="0" smtClean="0"/>
-              <a:t>RAM: </a:t>
-            </a:r>
-            <a:r>
-              <a:rPr lang="en-US" altLang="ko-KR" dirty="0" smtClean="0"/>
-              <a:t>4GB</a:t>
-            </a:r>
-            <a:endParaRPr lang="en-US" altLang="ko-KR" dirty="0" smtClean="0"/>
+              <a:t>RAM: 4GB</a:t>
+            </a:r>
           </a:p>
           <a:p>
             <a:pPr lvl="1"/>
@@ -7384,6 +8255,133 @@
           </a:bodyPr>
           <a:lstStyle/>
           <a:p>
+            <a:r>
+              <a:rPr lang="ko-KR" altLang="en-US" dirty="0" smtClean="0"/>
+              <a:t>타입</a:t>
+            </a:r>
+            <a:r>
+              <a:rPr lang="en-US" altLang="ko-KR" dirty="0" smtClean="0"/>
+              <a:t>: </a:t>
+            </a:r>
+            <a:r>
+              <a:rPr lang="ko-KR" altLang="en-US" dirty="0" smtClean="0"/>
+              <a:t>컴퓨터는 기본적으로 </a:t>
+            </a:r>
+            <a:r>
+              <a:rPr lang="en-US" altLang="ko-KR" dirty="0" smtClean="0"/>
+              <a:t>0</a:t>
+            </a:r>
+            <a:r>
+              <a:rPr lang="ko-KR" altLang="en-US" dirty="0" smtClean="0"/>
+              <a:t>과 </a:t>
+            </a:r>
+            <a:r>
+              <a:rPr lang="en-US" altLang="ko-KR" dirty="0" smtClean="0"/>
+              <a:t>1</a:t>
+            </a:r>
+            <a:r>
+              <a:rPr lang="ko-KR" altLang="en-US" dirty="0" smtClean="0"/>
+              <a:t>의 배열인 이진수를 다루지만 해석 방법에 따라 다른 유형의 값으로 볼 수 있습니다</a:t>
+            </a:r>
+            <a:r>
+              <a:rPr lang="en-US" altLang="ko-KR" dirty="0" smtClean="0"/>
+              <a:t>.</a:t>
+            </a:r>
+          </a:p>
+          <a:p>
+            <a:endParaRPr lang="en-US" altLang="ko-KR" dirty="0"/>
+          </a:p>
+          <a:p>
+            <a:r>
+              <a:rPr lang="en-US" altLang="ko-KR" dirty="0" err="1" smtClean="0"/>
+              <a:t>E.g</a:t>
+            </a:r>
+            <a:r>
+              <a:rPr lang="en-US" altLang="ko-KR" dirty="0" smtClean="0"/>
+              <a:t>) </a:t>
+            </a:r>
+            <a:r>
+              <a:rPr lang="en-US" altLang="ko-KR" dirty="0" smtClean="0"/>
+              <a:t>1011011001100110</a:t>
+            </a:r>
+          </a:p>
+          <a:p>
+            <a:pPr lvl="1"/>
+            <a:r>
+              <a:rPr lang="en-US" altLang="ko-KR" dirty="0" smtClean="0"/>
+              <a:t>2</a:t>
+            </a:r>
+            <a:r>
+              <a:rPr lang="ko-KR" altLang="en-US" dirty="0" smtClean="0"/>
+              <a:t>의 보수인 정수</a:t>
+            </a:r>
+            <a:r>
+              <a:rPr lang="ko-KR" altLang="en-US" dirty="0" smtClean="0"/>
+              <a:t>로 해석</a:t>
+            </a:r>
+            <a:r>
+              <a:rPr lang="en-US" altLang="ko-KR" dirty="0" smtClean="0"/>
+              <a:t>: -18842</a:t>
+            </a:r>
+          </a:p>
+          <a:p>
+            <a:pPr lvl="1"/>
+            <a:r>
+              <a:rPr lang="ko-KR" altLang="en-US" dirty="0" smtClean="0"/>
+              <a:t>실수로 해석</a:t>
+            </a:r>
+            <a:r>
+              <a:rPr lang="en-US" altLang="ko-KR" dirty="0" smtClean="0"/>
+              <a:t>: -0.4</a:t>
+            </a:r>
+          </a:p>
+          <a:p>
+            <a:pPr lvl="1"/>
+            <a:r>
+              <a:rPr lang="ko-KR" altLang="en-US" dirty="0" smtClean="0"/>
+              <a:t>사람이 </a:t>
+            </a:r>
+            <a:r>
+              <a:rPr lang="en-US" altLang="ko-KR" dirty="0" smtClean="0"/>
+              <a:t>10</a:t>
+            </a:r>
+            <a:r>
+              <a:rPr lang="ko-KR" altLang="en-US" dirty="0" smtClean="0"/>
+              <a:t>진수로 수를 표현하는 것과 완전히 다릅니다</a:t>
+            </a:r>
+            <a:r>
+              <a:rPr lang="en-US" altLang="ko-KR" dirty="0" smtClean="0"/>
+              <a:t>.</a:t>
+            </a:r>
+          </a:p>
+          <a:p>
+            <a:endParaRPr lang="en-US" altLang="ko-KR" dirty="0"/>
+          </a:p>
+          <a:p>
+            <a:r>
+              <a:rPr lang="ko-KR" altLang="en-US" dirty="0" smtClean="0"/>
+              <a:t>이와 같은 것과 다른 이유들로 인해 타입</a:t>
+            </a:r>
+            <a:r>
+              <a:rPr lang="en-US" altLang="ko-KR" dirty="0" smtClean="0"/>
+              <a:t>(</a:t>
+            </a:r>
+            <a:r>
+              <a:rPr lang="ko-KR" altLang="en-US" dirty="0" err="1" smtClean="0"/>
+              <a:t>자료형</a:t>
+            </a:r>
+            <a:r>
+              <a:rPr lang="en-US" altLang="ko-KR" dirty="0" smtClean="0"/>
+              <a:t>)</a:t>
+            </a:r>
+            <a:r>
+              <a:rPr lang="ko-KR" altLang="en-US" dirty="0" smtClean="0"/>
+              <a:t>이라는 개념이 생겼습니다</a:t>
+            </a:r>
+            <a:r>
+              <a:rPr lang="en-US" altLang="ko-KR" dirty="0" smtClean="0"/>
+              <a:t>.</a:t>
+            </a:r>
             <a:endParaRPr lang="en-US" altLang="ko-KR" dirty="0"/>
           </a:p>
         </p:txBody>

</xml_diff>